<commit_message>
rough draft actually complete
</commit_message>
<xml_diff>
--- a/assignment17/poster.pptx
+++ b/assignment17/poster.pptx
@@ -252,7 +252,7 @@
           <a:p>
             <a:fld id="{9DA80F7C-819D-478F-B0BD-76F1303226AC}" type="datetimeFigureOut">
               <a:rPr lang="en-US" smtClean="0"/>
-              <a:t>12/15/2022</a:t>
+              <a:t>12/16/2022</a:t>
             </a:fld>
             <a:endParaRPr lang="en-US"/>
           </a:p>
@@ -422,7 +422,7 @@
           <a:p>
             <a:fld id="{9DA80F7C-819D-478F-B0BD-76F1303226AC}" type="datetimeFigureOut">
               <a:rPr lang="en-US" smtClean="0"/>
-              <a:t>12/15/2022</a:t>
+              <a:t>12/16/2022</a:t>
             </a:fld>
             <a:endParaRPr lang="en-US"/>
           </a:p>
@@ -602,7 +602,7 @@
           <a:p>
             <a:fld id="{9DA80F7C-819D-478F-B0BD-76F1303226AC}" type="datetimeFigureOut">
               <a:rPr lang="en-US" smtClean="0"/>
-              <a:t>12/15/2022</a:t>
+              <a:t>12/16/2022</a:t>
             </a:fld>
             <a:endParaRPr lang="en-US"/>
           </a:p>
@@ -772,7 +772,7 @@
           <a:p>
             <a:fld id="{9DA80F7C-819D-478F-B0BD-76F1303226AC}" type="datetimeFigureOut">
               <a:rPr lang="en-US" smtClean="0"/>
-              <a:t>12/15/2022</a:t>
+              <a:t>12/16/2022</a:t>
             </a:fld>
             <a:endParaRPr lang="en-US"/>
           </a:p>
@@ -1016,7 +1016,7 @@
           <a:p>
             <a:fld id="{9DA80F7C-819D-478F-B0BD-76F1303226AC}" type="datetimeFigureOut">
               <a:rPr lang="en-US" smtClean="0"/>
-              <a:t>12/15/2022</a:t>
+              <a:t>12/16/2022</a:t>
             </a:fld>
             <a:endParaRPr lang="en-US"/>
           </a:p>
@@ -1248,7 +1248,7 @@
           <a:p>
             <a:fld id="{9DA80F7C-819D-478F-B0BD-76F1303226AC}" type="datetimeFigureOut">
               <a:rPr lang="en-US" smtClean="0"/>
-              <a:t>12/15/2022</a:t>
+              <a:t>12/16/2022</a:t>
             </a:fld>
             <a:endParaRPr lang="en-US"/>
           </a:p>
@@ -1615,7 +1615,7 @@
           <a:p>
             <a:fld id="{9DA80F7C-819D-478F-B0BD-76F1303226AC}" type="datetimeFigureOut">
               <a:rPr lang="en-US" smtClean="0"/>
-              <a:t>12/15/2022</a:t>
+              <a:t>12/16/2022</a:t>
             </a:fld>
             <a:endParaRPr lang="en-US"/>
           </a:p>
@@ -1733,7 +1733,7 @@
           <a:p>
             <a:fld id="{9DA80F7C-819D-478F-B0BD-76F1303226AC}" type="datetimeFigureOut">
               <a:rPr lang="en-US" smtClean="0"/>
-              <a:t>12/15/2022</a:t>
+              <a:t>12/16/2022</a:t>
             </a:fld>
             <a:endParaRPr lang="en-US"/>
           </a:p>
@@ -1836,7 +1836,7 @@
           <a:p>
             <a:fld id="{9DA80F7C-819D-478F-B0BD-76F1303226AC}" type="datetimeFigureOut">
               <a:rPr lang="en-US" smtClean="0"/>
-              <a:t>12/15/2022</a:t>
+              <a:t>12/16/2022</a:t>
             </a:fld>
             <a:endParaRPr lang="en-US"/>
           </a:p>
@@ -2113,7 +2113,7 @@
           <a:p>
             <a:fld id="{9DA80F7C-819D-478F-B0BD-76F1303226AC}" type="datetimeFigureOut">
               <a:rPr lang="en-US" smtClean="0"/>
-              <a:t>12/15/2022</a:t>
+              <a:t>12/16/2022</a:t>
             </a:fld>
             <a:endParaRPr lang="en-US"/>
           </a:p>
@@ -2370,7 +2370,7 @@
           <a:p>
             <a:fld id="{9DA80F7C-819D-478F-B0BD-76F1303226AC}" type="datetimeFigureOut">
               <a:rPr lang="en-US" smtClean="0"/>
-              <a:t>12/15/2022</a:t>
+              <a:t>12/16/2022</a:t>
             </a:fld>
             <a:endParaRPr lang="en-US"/>
           </a:p>
@@ -2583,7 +2583,7 @@
           <a:p>
             <a:fld id="{9DA80F7C-819D-478F-B0BD-76F1303226AC}" type="datetimeFigureOut">
               <a:rPr lang="en-US" smtClean="0"/>
-              <a:t>12/15/2022</a:t>
+              <a:t>12/16/2022</a:t>
             </a:fld>
             <a:endParaRPr lang="en-US"/>
           </a:p>
@@ -6636,14 +6636,20 @@
               <a:lstStyle/>
               <a:p>
                 <a:r>
-                  <a:rPr lang="en-US" sz="3200" b="1" dirty="0">
+                  <a:rPr lang="en-US" sz="3200" b="1">
                     <a:solidFill>
                       <a:srgbClr val="FFFFFF"/>
                     </a:solidFill>
                     <a:latin typeface="Gotham" panose="02000504050000020004" pitchFamily="2" charset="0"/>
                   </a:rPr>
-                  <a:t>Predictive Model – Introduction</a:t>
+                  <a:t>Predictive Model</a:t>
                 </a:r>
+                <a:endParaRPr lang="en-US" sz="3200" b="1" dirty="0">
+                  <a:solidFill>
+                    <a:srgbClr val="FFFFFF"/>
+                  </a:solidFill>
+                  <a:latin typeface="Gotham" panose="02000504050000020004" pitchFamily="2" charset="0"/>
+                </a:endParaRPr>
               </a:p>
               <a:p>
                 <a:endParaRPr lang="en-US" sz="1600" b="1" dirty="0">

</xml_diff>